<commit_message>
Updates to MCC, recall, precision boxplots.
</commit_message>
<xml_diff>
--- a/Manuscript/recomendations_flowchart.pptx
+++ b/Manuscript/recomendations_flowchart.pptx
@@ -104,6 +104,11 @@
       </a:defRPr>
     </a:lvl9pPr>
   </p:defaultTextStyle>
+  <p:extLst>
+    <p:ext uri="{EFAFB233-063F-42B5-8137-9DF3F51BA10A}">
+      <p15:sldGuideLst xmlns:p15="http://schemas.microsoft.com/office/powerpoint/2012/main"/>
+    </p:ext>
+  </p:extLst>
 </p:presentation>
 </file>
 
@@ -254,7 +259,7 @@
           <a:p>
             <a:fld id="{810095CB-4F96-0C4C-B66B-F6DE61FEDA46}" type="datetimeFigureOut">
               <a:rPr lang="en-US" smtClean="0"/>
-              <a:t>6/27/23</a:t>
+              <a:t>8/17/23</a:t>
             </a:fld>
             <a:endParaRPr lang="en-US"/>
           </a:p>
@@ -452,7 +457,7 @@
           <a:p>
             <a:fld id="{810095CB-4F96-0C4C-B66B-F6DE61FEDA46}" type="datetimeFigureOut">
               <a:rPr lang="en-US" smtClean="0"/>
-              <a:t>6/27/23</a:t>
+              <a:t>8/17/23</a:t>
             </a:fld>
             <a:endParaRPr lang="en-US"/>
           </a:p>
@@ -660,7 +665,7 @@
           <a:p>
             <a:fld id="{810095CB-4F96-0C4C-B66B-F6DE61FEDA46}" type="datetimeFigureOut">
               <a:rPr lang="en-US" smtClean="0"/>
-              <a:t>6/27/23</a:t>
+              <a:t>8/17/23</a:t>
             </a:fld>
             <a:endParaRPr lang="en-US"/>
           </a:p>
@@ -858,7 +863,7 @@
           <a:p>
             <a:fld id="{810095CB-4F96-0C4C-B66B-F6DE61FEDA46}" type="datetimeFigureOut">
               <a:rPr lang="en-US" smtClean="0"/>
-              <a:t>6/27/23</a:t>
+              <a:t>8/17/23</a:t>
             </a:fld>
             <a:endParaRPr lang="en-US"/>
           </a:p>
@@ -1133,7 +1138,7 @@
           <a:p>
             <a:fld id="{810095CB-4F96-0C4C-B66B-F6DE61FEDA46}" type="datetimeFigureOut">
               <a:rPr lang="en-US" smtClean="0"/>
-              <a:t>6/27/23</a:t>
+              <a:t>8/17/23</a:t>
             </a:fld>
             <a:endParaRPr lang="en-US"/>
           </a:p>
@@ -1398,7 +1403,7 @@
           <a:p>
             <a:fld id="{810095CB-4F96-0C4C-B66B-F6DE61FEDA46}" type="datetimeFigureOut">
               <a:rPr lang="en-US" smtClean="0"/>
-              <a:t>6/27/23</a:t>
+              <a:t>8/17/23</a:t>
             </a:fld>
             <a:endParaRPr lang="en-US"/>
           </a:p>
@@ -1810,7 +1815,7 @@
           <a:p>
             <a:fld id="{810095CB-4F96-0C4C-B66B-F6DE61FEDA46}" type="datetimeFigureOut">
               <a:rPr lang="en-US" smtClean="0"/>
-              <a:t>6/27/23</a:t>
+              <a:t>8/17/23</a:t>
             </a:fld>
             <a:endParaRPr lang="en-US"/>
           </a:p>
@@ -1951,7 +1956,7 @@
           <a:p>
             <a:fld id="{810095CB-4F96-0C4C-B66B-F6DE61FEDA46}" type="datetimeFigureOut">
               <a:rPr lang="en-US" smtClean="0"/>
-              <a:t>6/27/23</a:t>
+              <a:t>8/17/23</a:t>
             </a:fld>
             <a:endParaRPr lang="en-US"/>
           </a:p>
@@ -2064,7 +2069,7 @@
           <a:p>
             <a:fld id="{810095CB-4F96-0C4C-B66B-F6DE61FEDA46}" type="datetimeFigureOut">
               <a:rPr lang="en-US" smtClean="0"/>
-              <a:t>6/27/23</a:t>
+              <a:t>8/17/23</a:t>
             </a:fld>
             <a:endParaRPr lang="en-US"/>
           </a:p>
@@ -2375,7 +2380,7 @@
           <a:p>
             <a:fld id="{810095CB-4F96-0C4C-B66B-F6DE61FEDA46}" type="datetimeFigureOut">
               <a:rPr lang="en-US" smtClean="0"/>
-              <a:t>6/27/23</a:t>
+              <a:t>8/17/23</a:t>
             </a:fld>
             <a:endParaRPr lang="en-US"/>
           </a:p>
@@ -2663,7 +2668,7 @@
           <a:p>
             <a:fld id="{810095CB-4F96-0C4C-B66B-F6DE61FEDA46}" type="datetimeFigureOut">
               <a:rPr lang="en-US" smtClean="0"/>
-              <a:t>6/27/23</a:t>
+              <a:t>8/17/23</a:t>
             </a:fld>
             <a:endParaRPr lang="en-US"/>
           </a:p>
@@ -2904,7 +2909,7 @@
           <a:p>
             <a:fld id="{810095CB-4F96-0C4C-B66B-F6DE61FEDA46}" type="datetimeFigureOut">
               <a:rPr lang="en-US" smtClean="0"/>
-              <a:t>6/27/23</a:t>
+              <a:t>8/17/23</a:t>
             </a:fld>
             <a:endParaRPr lang="en-US"/>
           </a:p>
@@ -3335,7 +3340,7 @@
         </p:nvSpPr>
         <p:spPr>
           <a:xfrm>
-            <a:off x="908612" y="1988133"/>
+            <a:off x="908612" y="1868389"/>
             <a:ext cx="816015" cy="523220"/>
           </a:xfrm>
           <a:prstGeom prst="rect">
@@ -3360,7 +3365,7 @@
                 <a:latin typeface="Arial" panose="020B0604020202020204" pitchFamily="34" charset="0"/>
                 <a:cs typeface="Arial" panose="020B0604020202020204" pitchFamily="34" charset="0"/>
               </a:rPr>
-              <a:t>Sample type?</a:t>
+              <a:t>sample type</a:t>
             </a:r>
           </a:p>
         </p:txBody>
@@ -3379,8 +3384,8 @@
         </p:nvSpPr>
         <p:spPr>
           <a:xfrm>
-            <a:off x="2276354" y="1596523"/>
-            <a:ext cx="1045580" cy="523220"/>
+            <a:off x="2276353" y="855617"/>
+            <a:ext cx="1136247" cy="738664"/>
           </a:xfrm>
           <a:prstGeom prst="rect">
             <a:avLst/>
@@ -3404,7 +3409,17 @@
                 <a:latin typeface="Arial" panose="020B0604020202020204" pitchFamily="34" charset="0"/>
                 <a:cs typeface="Arial" panose="020B0604020202020204" pitchFamily="34" charset="0"/>
               </a:rPr>
-              <a:t>Viral-enriched?</a:t>
+              <a:t>viral-enriched</a:t>
+            </a:r>
+          </a:p>
+          <a:p>
+            <a:pPr algn="ctr"/>
+            <a:r>
+              <a:rPr lang="en-US" sz="1400" dirty="0">
+                <a:latin typeface="Arial" panose="020B0604020202020204" pitchFamily="34" charset="0"/>
+                <a:cs typeface="Arial" panose="020B0604020202020204" pitchFamily="34" charset="0"/>
+              </a:rPr>
+              <a:t>(&lt;0.2µm)</a:t>
             </a:r>
           </a:p>
         </p:txBody>
@@ -3423,8 +3438,8 @@
         </p:nvSpPr>
         <p:spPr>
           <a:xfrm>
-            <a:off x="2276354" y="2480134"/>
-            <a:ext cx="1045580" cy="523220"/>
+            <a:off x="2276352" y="2658237"/>
+            <a:ext cx="1136247" cy="738664"/>
           </a:xfrm>
           <a:prstGeom prst="rect">
             <a:avLst/>
@@ -3448,7 +3463,17 @@
                 <a:latin typeface="Arial" panose="020B0604020202020204" pitchFamily="34" charset="0"/>
                 <a:cs typeface="Arial" panose="020B0604020202020204" pitchFamily="34" charset="0"/>
               </a:rPr>
-              <a:t>Cellular-enriched?</a:t>
+              <a:t>cellular-enriched</a:t>
+            </a:r>
+          </a:p>
+          <a:p>
+            <a:pPr algn="ctr"/>
+            <a:r>
+              <a:rPr lang="en-US" sz="1400" dirty="0">
+                <a:latin typeface="Arial" panose="020B0604020202020204" pitchFamily="34" charset="0"/>
+                <a:cs typeface="Arial" panose="020B0604020202020204" pitchFamily="34" charset="0"/>
+              </a:rPr>
+              <a:t>(&gt;0.2µm)</a:t>
             </a:r>
           </a:p>
         </p:txBody>
@@ -3467,8 +3492,8 @@
         </p:nvSpPr>
         <p:spPr>
           <a:xfrm>
-            <a:off x="5935881" y="1334913"/>
-            <a:ext cx="1136248" cy="523220"/>
+            <a:off x="4090752" y="1415864"/>
+            <a:ext cx="1896390" cy="523220"/>
           </a:xfrm>
           <a:prstGeom prst="rect">
             <a:avLst/>
@@ -3492,17 +3517,17 @@
                 <a:latin typeface="Arial" panose="020B0604020202020204" pitchFamily="34" charset="0"/>
                 <a:cs typeface="Arial" panose="020B0604020202020204" pitchFamily="34" charset="0"/>
               </a:rPr>
-              <a:t>“high MCC” ruleset</a:t>
-            </a:r>
-          </a:p>
-        </p:txBody>
-      </p:sp>
-      <p:sp>
-        <p:nvSpPr>
-          <p:cNvPr id="6" name="TextBox 5">
-            <a:extLst>
-              <a:ext uri="{FF2B5EF4-FFF2-40B4-BE49-F238E27FC236}">
-                <a16:creationId xmlns:a16="http://schemas.microsoft.com/office/drawing/2014/main" id="{5B1A014B-AF6D-5735-6615-DA7012364FEA}"/>
+              <a:t>“high MCC” + tuning addition ruleset</a:t>
+            </a:r>
+          </a:p>
+        </p:txBody>
+      </p:sp>
+      <p:sp>
+        <p:nvSpPr>
+          <p:cNvPr id="9" name="TextBox 8">
+            <a:extLst>
+              <a:ext uri="{FF2B5EF4-FFF2-40B4-BE49-F238E27FC236}">
+                <a16:creationId xmlns:a16="http://schemas.microsoft.com/office/drawing/2014/main" id="{60053ADB-F3C0-BD7C-2EC2-CC0A780E511E}"/>
               </a:ext>
             </a:extLst>
           </p:cNvPr>
@@ -3511,8 +3536,8 @@
         </p:nvSpPr>
         <p:spPr>
           <a:xfrm>
-            <a:off x="3944073" y="3094463"/>
-            <a:ext cx="1136248" cy="523220"/>
+            <a:off x="4090752" y="2873680"/>
+            <a:ext cx="1896390" cy="307777"/>
           </a:xfrm>
           <a:prstGeom prst="rect">
             <a:avLst/>
@@ -3536,95 +3561,7 @@
                 <a:latin typeface="Arial" panose="020B0604020202020204" pitchFamily="34" charset="0"/>
                 <a:cs typeface="Arial" panose="020B0604020202020204" pitchFamily="34" charset="0"/>
               </a:rPr>
-              <a:t>Bacteria-enriched?</a:t>
-            </a:r>
-          </a:p>
-        </p:txBody>
-      </p:sp>
-      <p:sp>
-        <p:nvSpPr>
-          <p:cNvPr id="7" name="TextBox 6">
-            <a:extLst>
-              <a:ext uri="{FF2B5EF4-FFF2-40B4-BE49-F238E27FC236}">
-                <a16:creationId xmlns:a16="http://schemas.microsoft.com/office/drawing/2014/main" id="{46E3BDF0-B8A8-947C-356A-FB4B00B23602}"/>
-              </a:ext>
-            </a:extLst>
-          </p:cNvPr>
-          <p:cNvSpPr txBox="1"/>
-          <p:nvPr/>
-        </p:nvSpPr>
-        <p:spPr>
-          <a:xfrm>
-            <a:off x="3944073" y="2323851"/>
-            <a:ext cx="1136248" cy="523220"/>
-          </a:xfrm>
-          <a:prstGeom prst="rect">
-            <a:avLst/>
-          </a:prstGeom>
-          <a:noFill/>
-          <a:ln>
-            <a:solidFill>
-              <a:schemeClr val="tx1"/>
-            </a:solidFill>
-          </a:ln>
-        </p:spPr>
-        <p:txBody>
-          <a:bodyPr wrap="square" rtlCol="0">
-            <a:spAutoFit/>
-          </a:bodyPr>
-          <a:lstStyle/>
-          <a:p>
-            <a:pPr algn="ctr"/>
-            <a:r>
-              <a:rPr lang="en-US" sz="1400" dirty="0">
-                <a:latin typeface="Arial" panose="020B0604020202020204" pitchFamily="34" charset="0"/>
-                <a:cs typeface="Arial" panose="020B0604020202020204" pitchFamily="34" charset="0"/>
-              </a:rPr>
-              <a:t>Eukaryotes present</a:t>
-            </a:r>
-          </a:p>
-        </p:txBody>
-      </p:sp>
-      <p:sp>
-        <p:nvSpPr>
-          <p:cNvPr id="9" name="TextBox 8">
-            <a:extLst>
-              <a:ext uri="{FF2B5EF4-FFF2-40B4-BE49-F238E27FC236}">
-                <a16:creationId xmlns:a16="http://schemas.microsoft.com/office/drawing/2014/main" id="{60053ADB-F3C0-BD7C-2EC2-CC0A780E511E}"/>
-              </a:ext>
-            </a:extLst>
-          </p:cNvPr>
-          <p:cNvSpPr txBox="1"/>
-          <p:nvPr/>
-        </p:nvSpPr>
-        <p:spPr>
-          <a:xfrm>
-            <a:off x="5667732" y="2986741"/>
-            <a:ext cx="1414041" cy="738664"/>
-          </a:xfrm>
-          <a:prstGeom prst="rect">
-            <a:avLst/>
-          </a:prstGeom>
-          <a:noFill/>
-          <a:ln>
-            <a:solidFill>
-              <a:schemeClr val="tx1"/>
-            </a:solidFill>
-          </a:ln>
-        </p:spPr>
-        <p:txBody>
-          <a:bodyPr wrap="square" rtlCol="0">
-            <a:spAutoFit/>
-          </a:bodyPr>
-          <a:lstStyle/>
-          <a:p>
-            <a:pPr algn="ctr"/>
-            <a:r>
-              <a:rPr lang="en-US" sz="1400" dirty="0">
-                <a:latin typeface="Arial" panose="020B0604020202020204" pitchFamily="34" charset="0"/>
-                <a:cs typeface="Arial" panose="020B0604020202020204" pitchFamily="34" charset="0"/>
-              </a:rPr>
-              <a:t>“high MCC” + tuning addition ruleset</a:t>
+              <a:t>“high MCC” ruleset</a:t>
             </a:r>
           </a:p>
         </p:txBody>
@@ -3639,6 +3576,7 @@
             </a:extLst>
           </p:cNvPr>
           <p:cNvCxnSpPr>
+            <a:cxnSpLocks/>
             <a:stCxn id="2" idx="3"/>
             <a:endCxn id="3" idx="1"/>
           </p:cNvCxnSpPr>
@@ -3646,8 +3584,8 @@
         </p:nvCxnSpPr>
         <p:spPr>
           <a:xfrm flipV="1">
-            <a:off x="1724627" y="1858133"/>
-            <a:ext cx="551727" cy="391610"/>
+            <a:off x="1724627" y="1224949"/>
+            <a:ext cx="551726" cy="905050"/>
           </a:xfrm>
           <a:prstGeom prst="straightConnector1">
             <a:avLst/>
@@ -3692,8 +3630,8 @@
         </p:nvCxnSpPr>
         <p:spPr>
           <a:xfrm>
-            <a:off x="1724627" y="2249743"/>
-            <a:ext cx="551727" cy="492001"/>
+            <a:off x="1724627" y="2129999"/>
+            <a:ext cx="551725" cy="897570"/>
           </a:xfrm>
           <a:prstGeom prst="straightConnector1">
             <a:avLst/>
@@ -3737,55 +3675,9 @@
           <p:nvPr/>
         </p:nvCxnSpPr>
         <p:spPr>
-          <a:xfrm flipV="1">
-            <a:off x="3321934" y="1596523"/>
-            <a:ext cx="2613947" cy="261610"/>
-          </a:xfrm>
-          <a:prstGeom prst="straightConnector1">
-            <a:avLst/>
-          </a:prstGeom>
-          <a:ln>
-            <a:solidFill>
-              <a:schemeClr val="tx1"/>
-            </a:solidFill>
-            <a:tailEnd type="triangle"/>
-          </a:ln>
-        </p:spPr>
-        <p:style>
-          <a:lnRef idx="1">
-            <a:schemeClr val="accent1"/>
-          </a:lnRef>
-          <a:fillRef idx="0">
-            <a:schemeClr val="accent1"/>
-          </a:fillRef>
-          <a:effectRef idx="0">
-            <a:schemeClr val="accent1"/>
-          </a:effectRef>
-          <a:fontRef idx="minor">
-            <a:schemeClr val="tx1"/>
-          </a:fontRef>
-        </p:style>
-      </p:cxnSp>
-      <p:cxnSp>
-        <p:nvCxnSpPr>
-          <p:cNvPr id="18" name="Straight Arrow Connector 17">
-            <a:extLst>
-              <a:ext uri="{FF2B5EF4-FFF2-40B4-BE49-F238E27FC236}">
-                <a16:creationId xmlns:a16="http://schemas.microsoft.com/office/drawing/2014/main" id="{B3C8EA8D-5322-BAEF-9D28-08FE9B2C2439}"/>
-              </a:ext>
-            </a:extLst>
-          </p:cNvPr>
-          <p:cNvCxnSpPr>
-            <a:cxnSpLocks/>
-            <a:stCxn id="4" idx="3"/>
-            <a:endCxn id="7" idx="1"/>
-          </p:cNvCxnSpPr>
-          <p:nvPr/>
-        </p:nvCxnSpPr>
-        <p:spPr>
-          <a:xfrm flipV="1">
-            <a:off x="3321934" y="2585461"/>
-            <a:ext cx="622139" cy="156283"/>
+          <a:xfrm>
+            <a:off x="3412600" y="1224949"/>
+            <a:ext cx="678152" cy="452525"/>
           </a:xfrm>
           <a:prstGeom prst="straightConnector1">
             <a:avLst/>
@@ -3823,61 +3715,15 @@
           </p:cNvPr>
           <p:cNvCxnSpPr>
             <a:cxnSpLocks/>
-            <a:stCxn id="7" idx="3"/>
+            <a:stCxn id="105" idx="3"/>
             <a:endCxn id="5" idx="1"/>
           </p:cNvCxnSpPr>
           <p:nvPr/>
         </p:nvCxnSpPr>
         <p:spPr>
           <a:xfrm flipV="1">
-            <a:off x="5080321" y="1596523"/>
-            <a:ext cx="855560" cy="988938"/>
-          </a:xfrm>
-          <a:prstGeom prst="straightConnector1">
-            <a:avLst/>
-          </a:prstGeom>
-          <a:ln>
-            <a:solidFill>
-              <a:schemeClr val="tx1"/>
-            </a:solidFill>
-            <a:tailEnd type="triangle"/>
-          </a:ln>
-        </p:spPr>
-        <p:style>
-          <a:lnRef idx="1">
-            <a:schemeClr val="accent1"/>
-          </a:lnRef>
-          <a:fillRef idx="0">
-            <a:schemeClr val="accent1"/>
-          </a:fillRef>
-          <a:effectRef idx="0">
-            <a:schemeClr val="accent1"/>
-          </a:effectRef>
-          <a:fontRef idx="minor">
-            <a:schemeClr val="tx1"/>
-          </a:fontRef>
-        </p:style>
-      </p:cxnSp>
-      <p:cxnSp>
-        <p:nvCxnSpPr>
-          <p:cNvPr id="24" name="Straight Arrow Connector 23">
-            <a:extLst>
-              <a:ext uri="{FF2B5EF4-FFF2-40B4-BE49-F238E27FC236}">
-                <a16:creationId xmlns:a16="http://schemas.microsoft.com/office/drawing/2014/main" id="{5C47FEF3-B6EF-EC39-4F05-D4C7B7925A80}"/>
-              </a:ext>
-            </a:extLst>
-          </p:cNvPr>
-          <p:cNvCxnSpPr>
-            <a:cxnSpLocks/>
-            <a:stCxn id="4" idx="3"/>
-            <a:endCxn id="6" idx="1"/>
-          </p:cNvCxnSpPr>
-          <p:nvPr/>
-        </p:nvCxnSpPr>
-        <p:spPr>
-          <a:xfrm>
-            <a:off x="3321934" y="2741744"/>
-            <a:ext cx="622139" cy="614329"/>
+            <a:off x="3412601" y="1677474"/>
+            <a:ext cx="678151" cy="448785"/>
           </a:xfrm>
           <a:prstGeom prst="straightConnector1">
             <a:avLst/>
@@ -3915,15 +3761,15 @@
           </p:cNvPr>
           <p:cNvCxnSpPr>
             <a:cxnSpLocks/>
-            <a:stCxn id="6" idx="3"/>
+            <a:stCxn id="4" idx="3"/>
             <a:endCxn id="9" idx="1"/>
           </p:cNvCxnSpPr>
           <p:nvPr/>
         </p:nvCxnSpPr>
         <p:spPr>
           <a:xfrm>
-            <a:off x="5080321" y="3356073"/>
-            <a:ext cx="587411" cy="0"/>
+            <a:off x="3412599" y="3027569"/>
+            <a:ext cx="678153" cy="0"/>
           </a:xfrm>
           <a:prstGeom prst="straightConnector1">
             <a:avLst/>
@@ -3964,7 +3810,7 @@
         </p:nvSpPr>
         <p:spPr>
           <a:xfrm>
-            <a:off x="894144" y="4536492"/>
+            <a:off x="832410" y="4904167"/>
             <a:ext cx="1244278" cy="738664"/>
           </a:xfrm>
           <a:prstGeom prst="rect">
@@ -3989,7 +3835,7 @@
                 <a:latin typeface="Arial" panose="020B0604020202020204" pitchFamily="34" charset="0"/>
                 <a:cs typeface="Arial" panose="020B0604020202020204" pitchFamily="34" charset="0"/>
               </a:rPr>
-              <a:t>Looking to minimize tools used</a:t>
+              <a:t>Looking to use the fewest tools</a:t>
             </a:r>
           </a:p>
         </p:txBody>
@@ -4008,8 +3854,8 @@
         </p:nvSpPr>
         <p:spPr>
           <a:xfrm>
-            <a:off x="2884025" y="4152554"/>
-            <a:ext cx="1045580" cy="738664"/>
+            <a:off x="2614497" y="4130900"/>
+            <a:ext cx="1437742" cy="523220"/>
           </a:xfrm>
           <a:prstGeom prst="rect">
             <a:avLst/>
@@ -4033,7 +3879,7 @@
                 <a:latin typeface="Arial" panose="020B0604020202020204" pitchFamily="34" charset="0"/>
                 <a:cs typeface="Arial" panose="020B0604020202020204" pitchFamily="34" charset="0"/>
               </a:rPr>
-              <a:t>Want to maximize recall</a:t>
+              <a:t>To maximize viral discovery</a:t>
             </a:r>
           </a:p>
         </p:txBody>
@@ -4052,8 +3898,8 @@
         </p:nvSpPr>
         <p:spPr>
           <a:xfrm>
-            <a:off x="2884025" y="5260550"/>
-            <a:ext cx="1045580" cy="738664"/>
+            <a:off x="2614497" y="5892878"/>
+            <a:ext cx="1437742" cy="738664"/>
           </a:xfrm>
           <a:prstGeom prst="rect">
             <a:avLst/>
@@ -4077,7 +3923,7 @@
                 <a:latin typeface="Arial" panose="020B0604020202020204" pitchFamily="34" charset="0"/>
                 <a:cs typeface="Arial" panose="020B0604020202020204" pitchFamily="34" charset="0"/>
               </a:rPr>
-              <a:t>Want to maximize precision</a:t>
+              <a:t>To minimize non-viral contamination</a:t>
             </a:r>
           </a:p>
         </p:txBody>
@@ -4100,8 +3946,8 @@
         </p:nvCxnSpPr>
         <p:spPr>
           <a:xfrm flipV="1">
-            <a:off x="2138422" y="4521886"/>
-            <a:ext cx="745603" cy="383938"/>
+            <a:off x="2076688" y="4392510"/>
+            <a:ext cx="537809" cy="880989"/>
           </a:xfrm>
           <a:prstGeom prst="straightConnector1">
             <a:avLst/>
@@ -4146,8 +3992,8 @@
         </p:nvCxnSpPr>
         <p:spPr>
           <a:xfrm>
-            <a:off x="2138422" y="4905824"/>
-            <a:ext cx="745603" cy="724058"/>
+            <a:off x="2076688" y="5273499"/>
+            <a:ext cx="537809" cy="988711"/>
           </a:xfrm>
           <a:prstGeom prst="straightConnector1">
             <a:avLst/>
@@ -4188,8 +4034,8 @@
         </p:nvSpPr>
         <p:spPr>
           <a:xfrm>
-            <a:off x="4916827" y="4156866"/>
-            <a:ext cx="1607435" cy="738664"/>
+            <a:off x="4604516" y="4133450"/>
+            <a:ext cx="2634827" cy="523220"/>
           </a:xfrm>
           <a:prstGeom prst="rect">
             <a:avLst/>
@@ -4213,7 +4059,17 @@
                 <a:latin typeface="Arial" panose="020B0604020202020204" pitchFamily="34" charset="0"/>
                 <a:cs typeface="Arial" panose="020B0604020202020204" pitchFamily="34" charset="0"/>
               </a:rPr>
-              <a:t>VS2 + tuning removal rule (VS2 + </a:t>
+              <a:t>VS2 + tuning rules </a:t>
+            </a:r>
+          </a:p>
+          <a:p>
+            <a:pPr algn="ctr"/>
+            <a:r>
+              <a:rPr lang="en-US" sz="1400" dirty="0">
+                <a:latin typeface="Arial" panose="020B0604020202020204" pitchFamily="34" charset="0"/>
+                <a:cs typeface="Arial" panose="020B0604020202020204" pitchFamily="34" charset="0"/>
+              </a:rPr>
+              <a:t>(VS2 + </a:t>
             </a:r>
             <a:r>
               <a:rPr lang="en-US" sz="1400" dirty="0" err="1">
@@ -4227,7 +4083,7 @@
                 <a:latin typeface="Arial" panose="020B0604020202020204" pitchFamily="34" charset="0"/>
                 <a:cs typeface="Arial" panose="020B0604020202020204" pitchFamily="34" charset="0"/>
               </a:rPr>
-              <a:t> only)</a:t>
+              <a:t> subrules only)</a:t>
             </a:r>
           </a:p>
         </p:txBody>
@@ -4246,8 +4102,8 @@
         </p:nvSpPr>
         <p:spPr>
           <a:xfrm>
-            <a:off x="4799149" y="5255770"/>
-            <a:ext cx="1889087" cy="738664"/>
+            <a:off x="5203058" y="6108321"/>
+            <a:ext cx="1437742" cy="307777"/>
           </a:xfrm>
           <a:prstGeom prst="rect">
             <a:avLst/>
@@ -4271,21 +4127,7 @@
                 <a:latin typeface="Arial" panose="020B0604020202020204" pitchFamily="34" charset="0"/>
                 <a:cs typeface="Arial" panose="020B0604020202020204" pitchFamily="34" charset="0"/>
               </a:rPr>
-              <a:t>VIBRANT + tuning rules (</a:t>
-            </a:r>
-            <a:r>
-              <a:rPr lang="en-US" sz="1400" dirty="0" err="1">
-                <a:latin typeface="Arial" panose="020B0604020202020204" pitchFamily="34" charset="0"/>
-                <a:cs typeface="Arial" panose="020B0604020202020204" pitchFamily="34" charset="0"/>
-              </a:rPr>
-              <a:t>checkV</a:t>
-            </a:r>
-            <a:r>
-              <a:rPr lang="en-US" sz="1400" dirty="0">
-                <a:latin typeface="Arial" panose="020B0604020202020204" pitchFamily="34" charset="0"/>
-                <a:cs typeface="Arial" panose="020B0604020202020204" pitchFamily="34" charset="0"/>
-              </a:rPr>
-              <a:t> subrules only)</a:t>
+              <a:t>VIBRANT</a:t>
             </a:r>
           </a:p>
         </p:txBody>
@@ -4308,8 +4150,8 @@
         </p:nvCxnSpPr>
         <p:spPr>
           <a:xfrm>
-            <a:off x="3929605" y="4521886"/>
-            <a:ext cx="987222" cy="4312"/>
+            <a:off x="4052239" y="4392510"/>
+            <a:ext cx="552277" cy="2550"/>
           </a:xfrm>
           <a:prstGeom prst="straightConnector1">
             <a:avLst/>
@@ -4353,9 +4195,9 @@
           <p:nvPr/>
         </p:nvCxnSpPr>
         <p:spPr>
-          <a:xfrm flipV="1">
-            <a:off x="3929605" y="5625102"/>
-            <a:ext cx="869544" cy="4780"/>
+          <a:xfrm>
+            <a:off x="4052239" y="6262210"/>
+            <a:ext cx="1150819" cy="0"/>
           </a:xfrm>
           <a:prstGeom prst="straightConnector1">
             <a:avLst/>
@@ -4396,8 +4238,8 @@
         </p:nvSpPr>
         <p:spPr>
           <a:xfrm>
-            <a:off x="578734" y="1334913"/>
-            <a:ext cx="317716" cy="369332"/>
+            <a:off x="578734" y="1215169"/>
+            <a:ext cx="393056" cy="523220"/>
           </a:xfrm>
           <a:prstGeom prst="rect">
             <a:avLst/>
@@ -4411,7 +4253,7 @@
           <a:lstStyle/>
           <a:p>
             <a:r>
-              <a:rPr lang="en-US" dirty="0"/>
+              <a:rPr lang="en-US" sz="2800" dirty="0"/>
               <a:t>A</a:t>
             </a:r>
           </a:p>
@@ -4432,7 +4274,7 @@
         <p:spPr>
           <a:xfrm>
             <a:off x="579616" y="3997100"/>
-            <a:ext cx="317716" cy="369332"/>
+            <a:ext cx="380232" cy="523220"/>
           </a:xfrm>
           <a:prstGeom prst="rect">
             <a:avLst/>
@@ -4446,12 +4288,316 @@
           <a:lstStyle/>
           <a:p>
             <a:r>
-              <a:rPr lang="en-US" dirty="0"/>
+              <a:rPr lang="en-US" sz="2800" dirty="0"/>
               <a:t>B</a:t>
             </a:r>
           </a:p>
         </p:txBody>
       </p:sp>
+      <p:sp>
+        <p:nvSpPr>
+          <p:cNvPr id="74" name="TextBox 73">
+            <a:extLst>
+              <a:ext uri="{FF2B5EF4-FFF2-40B4-BE49-F238E27FC236}">
+                <a16:creationId xmlns:a16="http://schemas.microsoft.com/office/drawing/2014/main" id="{DD572516-B04E-2FF8-A27A-1EA291CC34B3}"/>
+              </a:ext>
+            </a:extLst>
+          </p:cNvPr>
+          <p:cNvSpPr txBox="1"/>
+          <p:nvPr/>
+        </p:nvSpPr>
+        <p:spPr>
+          <a:xfrm>
+            <a:off x="2614497" y="4904167"/>
+            <a:ext cx="1437742" cy="738664"/>
+          </a:xfrm>
+          <a:prstGeom prst="rect">
+            <a:avLst/>
+          </a:prstGeom>
+          <a:noFill/>
+          <a:ln>
+            <a:solidFill>
+              <a:schemeClr val="tx1"/>
+            </a:solidFill>
+          </a:ln>
+        </p:spPr>
+        <p:txBody>
+          <a:bodyPr wrap="square" rtlCol="0">
+            <a:spAutoFit/>
+          </a:bodyPr>
+          <a:lstStyle/>
+          <a:p>
+            <a:pPr algn="ctr"/>
+            <a:r>
+              <a:rPr lang="en-US" sz="1400" dirty="0">
+                <a:latin typeface="Arial" panose="020B0604020202020204" pitchFamily="34" charset="0"/>
+                <a:cs typeface="Arial" panose="020B0604020202020204" pitchFamily="34" charset="0"/>
+              </a:rPr>
+              <a:t>To balance contamination and discovery</a:t>
+            </a:r>
+          </a:p>
+        </p:txBody>
+      </p:sp>
+      <p:cxnSp>
+        <p:nvCxnSpPr>
+          <p:cNvPr id="75" name="Straight Arrow Connector 74">
+            <a:extLst>
+              <a:ext uri="{FF2B5EF4-FFF2-40B4-BE49-F238E27FC236}">
+                <a16:creationId xmlns:a16="http://schemas.microsoft.com/office/drawing/2014/main" id="{61B55B2C-6A81-DC02-EC60-8BDDD7E55216}"/>
+              </a:ext>
+            </a:extLst>
+          </p:cNvPr>
+          <p:cNvCxnSpPr>
+            <a:cxnSpLocks/>
+            <a:stCxn id="34" idx="3"/>
+            <a:endCxn id="74" idx="1"/>
+          </p:cNvCxnSpPr>
+          <p:nvPr/>
+        </p:nvCxnSpPr>
+        <p:spPr>
+          <a:xfrm>
+            <a:off x="2076688" y="5273499"/>
+            <a:ext cx="537809" cy="0"/>
+          </a:xfrm>
+          <a:prstGeom prst="straightConnector1">
+            <a:avLst/>
+          </a:prstGeom>
+          <a:ln>
+            <a:solidFill>
+              <a:schemeClr val="tx1"/>
+            </a:solidFill>
+            <a:tailEnd type="triangle"/>
+          </a:ln>
+        </p:spPr>
+        <p:style>
+          <a:lnRef idx="1">
+            <a:schemeClr val="accent1"/>
+          </a:lnRef>
+          <a:fillRef idx="0">
+            <a:schemeClr val="accent1"/>
+          </a:fillRef>
+          <a:effectRef idx="0">
+            <a:schemeClr val="accent1"/>
+          </a:effectRef>
+          <a:fontRef idx="minor">
+            <a:schemeClr val="tx1"/>
+          </a:fontRef>
+        </p:style>
+      </p:cxnSp>
+      <p:sp>
+        <p:nvSpPr>
+          <p:cNvPr id="81" name="TextBox 80">
+            <a:extLst>
+              <a:ext uri="{FF2B5EF4-FFF2-40B4-BE49-F238E27FC236}">
+                <a16:creationId xmlns:a16="http://schemas.microsoft.com/office/drawing/2014/main" id="{BE917AA7-D7F7-AB30-AC6D-BFC593EF48CF}"/>
+              </a:ext>
+            </a:extLst>
+          </p:cNvPr>
+          <p:cNvSpPr txBox="1"/>
+          <p:nvPr/>
+        </p:nvSpPr>
+        <p:spPr>
+          <a:xfrm>
+            <a:off x="4604516" y="5011889"/>
+            <a:ext cx="2634827" cy="523220"/>
+          </a:xfrm>
+          <a:prstGeom prst="rect">
+            <a:avLst/>
+          </a:prstGeom>
+          <a:noFill/>
+          <a:ln>
+            <a:solidFill>
+              <a:schemeClr val="tx1"/>
+            </a:solidFill>
+          </a:ln>
+        </p:spPr>
+        <p:txBody>
+          <a:bodyPr wrap="square" rtlCol="0">
+            <a:spAutoFit/>
+          </a:bodyPr>
+          <a:lstStyle/>
+          <a:p>
+            <a:pPr algn="ctr"/>
+            <a:r>
+              <a:rPr lang="en-US" sz="1400" dirty="0">
+                <a:latin typeface="Arial" panose="020B0604020202020204" pitchFamily="34" charset="0"/>
+                <a:cs typeface="Arial" panose="020B0604020202020204" pitchFamily="34" charset="0"/>
+              </a:rPr>
+              <a:t>VS2 + tuning removal rules</a:t>
+            </a:r>
+          </a:p>
+          <a:p>
+            <a:pPr algn="ctr"/>
+            <a:r>
+              <a:rPr lang="en-US" sz="1400" dirty="0">
+                <a:latin typeface="Arial" panose="020B0604020202020204" pitchFamily="34" charset="0"/>
+                <a:cs typeface="Arial" panose="020B0604020202020204" pitchFamily="34" charset="0"/>
+              </a:rPr>
+              <a:t>(VS2 + </a:t>
+            </a:r>
+            <a:r>
+              <a:rPr lang="en-US" sz="1400" dirty="0" err="1">
+                <a:latin typeface="Arial" panose="020B0604020202020204" pitchFamily="34" charset="0"/>
+                <a:cs typeface="Arial" panose="020B0604020202020204" pitchFamily="34" charset="0"/>
+              </a:rPr>
+              <a:t>checkV</a:t>
+            </a:r>
+            <a:r>
+              <a:rPr lang="en-US" sz="1400" dirty="0">
+                <a:latin typeface="Arial" panose="020B0604020202020204" pitchFamily="34" charset="0"/>
+                <a:cs typeface="Arial" panose="020B0604020202020204" pitchFamily="34" charset="0"/>
+              </a:rPr>
+              <a:t> subrules only)</a:t>
+            </a:r>
+          </a:p>
+        </p:txBody>
+      </p:sp>
+      <p:cxnSp>
+        <p:nvCxnSpPr>
+          <p:cNvPr id="82" name="Straight Arrow Connector 81">
+            <a:extLst>
+              <a:ext uri="{FF2B5EF4-FFF2-40B4-BE49-F238E27FC236}">
+                <a16:creationId xmlns:a16="http://schemas.microsoft.com/office/drawing/2014/main" id="{CD2C1D4F-1708-C3E5-24E7-1A8C01C5623A}"/>
+              </a:ext>
+            </a:extLst>
+          </p:cNvPr>
+          <p:cNvCxnSpPr>
+            <a:cxnSpLocks/>
+            <a:stCxn id="74" idx="3"/>
+            <a:endCxn id="81" idx="1"/>
+          </p:cNvCxnSpPr>
+          <p:nvPr/>
+        </p:nvCxnSpPr>
+        <p:spPr>
+          <a:xfrm>
+            <a:off x="4052239" y="5273499"/>
+            <a:ext cx="552277" cy="0"/>
+          </a:xfrm>
+          <a:prstGeom prst="straightConnector1">
+            <a:avLst/>
+          </a:prstGeom>
+          <a:ln>
+            <a:solidFill>
+              <a:schemeClr val="tx1"/>
+            </a:solidFill>
+            <a:tailEnd type="triangle"/>
+          </a:ln>
+        </p:spPr>
+        <p:style>
+          <a:lnRef idx="1">
+            <a:schemeClr val="accent1"/>
+          </a:lnRef>
+          <a:fillRef idx="0">
+            <a:schemeClr val="accent1"/>
+          </a:fillRef>
+          <a:effectRef idx="0">
+            <a:schemeClr val="accent1"/>
+          </a:effectRef>
+          <a:fontRef idx="minor">
+            <a:schemeClr val="tx1"/>
+          </a:fontRef>
+        </p:style>
+      </p:cxnSp>
+      <p:sp>
+        <p:nvSpPr>
+          <p:cNvPr id="105" name="TextBox 104">
+            <a:extLst>
+              <a:ext uri="{FF2B5EF4-FFF2-40B4-BE49-F238E27FC236}">
+                <a16:creationId xmlns:a16="http://schemas.microsoft.com/office/drawing/2014/main" id="{580D9868-F021-F437-5F56-587D307BCC12}"/>
+              </a:ext>
+            </a:extLst>
+          </p:cNvPr>
+          <p:cNvSpPr txBox="1"/>
+          <p:nvPr/>
+        </p:nvSpPr>
+        <p:spPr>
+          <a:xfrm>
+            <a:off x="2276353" y="1756927"/>
+            <a:ext cx="1136248" cy="738664"/>
+          </a:xfrm>
+          <a:prstGeom prst="rect">
+            <a:avLst/>
+          </a:prstGeom>
+          <a:noFill/>
+          <a:ln>
+            <a:solidFill>
+              <a:schemeClr val="tx1"/>
+            </a:solidFill>
+          </a:ln>
+        </p:spPr>
+        <p:txBody>
+          <a:bodyPr wrap="square" rtlCol="0">
+            <a:spAutoFit/>
+          </a:bodyPr>
+          <a:lstStyle/>
+          <a:p>
+            <a:pPr algn="ctr"/>
+            <a:r>
+              <a:rPr lang="en-US" sz="1400" dirty="0">
+                <a:latin typeface="Arial" panose="020B0604020202020204" pitchFamily="34" charset="0"/>
+                <a:cs typeface="Arial" panose="020B0604020202020204" pitchFamily="34" charset="0"/>
+              </a:rPr>
+              <a:t>bacteria-enriched</a:t>
+            </a:r>
+          </a:p>
+          <a:p>
+            <a:pPr algn="ctr"/>
+            <a:r>
+              <a:rPr lang="en-US" sz="1400" dirty="0">
+                <a:latin typeface="Arial" panose="020B0604020202020204" pitchFamily="34" charset="0"/>
+                <a:cs typeface="Arial" panose="020B0604020202020204" pitchFamily="34" charset="0"/>
+              </a:rPr>
+              <a:t>(0.2-3.0µm)</a:t>
+            </a:r>
+          </a:p>
+        </p:txBody>
+      </p:sp>
+      <p:cxnSp>
+        <p:nvCxnSpPr>
+          <p:cNvPr id="106" name="Straight Arrow Connector 105">
+            <a:extLst>
+              <a:ext uri="{FF2B5EF4-FFF2-40B4-BE49-F238E27FC236}">
+                <a16:creationId xmlns:a16="http://schemas.microsoft.com/office/drawing/2014/main" id="{2D5C5578-9748-A302-2D40-DDD3B69E6BF2}"/>
+              </a:ext>
+            </a:extLst>
+          </p:cNvPr>
+          <p:cNvCxnSpPr>
+            <a:cxnSpLocks/>
+            <a:stCxn id="2" idx="3"/>
+            <a:endCxn id="105" idx="1"/>
+          </p:cNvCxnSpPr>
+          <p:nvPr/>
+        </p:nvCxnSpPr>
+        <p:spPr>
+          <a:xfrm flipV="1">
+            <a:off x="1724627" y="2126259"/>
+            <a:ext cx="551726" cy="3740"/>
+          </a:xfrm>
+          <a:prstGeom prst="straightConnector1">
+            <a:avLst/>
+          </a:prstGeom>
+          <a:ln>
+            <a:solidFill>
+              <a:schemeClr val="tx1"/>
+            </a:solidFill>
+            <a:tailEnd type="triangle"/>
+          </a:ln>
+        </p:spPr>
+        <p:style>
+          <a:lnRef idx="1">
+            <a:schemeClr val="accent1"/>
+          </a:lnRef>
+          <a:fillRef idx="0">
+            <a:schemeClr val="accent1"/>
+          </a:fillRef>
+          <a:effectRef idx="0">
+            <a:schemeClr val="accent1"/>
+          </a:effectRef>
+          <a:fontRef idx="minor">
+            <a:schemeClr val="tx1"/>
+          </a:fontRef>
+        </p:style>
+      </p:cxnSp>
     </p:spTree>
     <p:extLst>
       <p:ext uri="{BB962C8B-B14F-4D97-AF65-F5344CB8AC3E}">

</xml_diff>